<commit_message>
Update pptx presentation file.
</commit_message>
<xml_diff>
--- a/part4.pptx
+++ b/part4.pptx
@@ -4760,14 +4760,14 @@
             <a:pPr lvl="1"/>
             <a:r>
               <a:rPr lang="en-US" dirty="0"/>
-              <a:t>Expand to more areas in the metropolitan area and eventually to other cities in the country.</a:t>
+              <a:t>Expand to more areas in the metropolitan area and eventually to other cities and rural areas in the country.</a:t>
             </a:r>
           </a:p>
           <a:p>
             <a:pPr lvl="1"/>
             <a:r>
               <a:rPr lang="en-US" dirty="0"/>
-              <a:t>Look at data from other years- how does weather change and how (if at all) does this affect beer consumption?</a:t>
+              <a:t>Look at data from other years- how does weather change and how does this affect beer consumption?</a:t>
             </a:r>
           </a:p>
           <a:p>
@@ -4888,6 +4888,12 @@
             <a:r>
               <a:rPr lang="en-US" dirty="0"/>
               <a:t>Beer is the most consumed alcoholic beverage in Brazil.</a:t>
+            </a:r>
+          </a:p>
+          <a:p>
+            <a:r>
+              <a:rPr lang="en-US" dirty="0"/>
+              <a:t>Brazil is the third largest beer producer in the world.</a:t>
             </a:r>
           </a:p>
           <a:p>

</xml_diff>